<commit_message>
more edits from proof reading
</commit_message>
<xml_diff>
--- a/Help/Figures5.pptx
+++ b/Help/Figures5.pptx
@@ -262,7 +262,7 @@
           <a:p>
             <a:fld id="{054E8CB3-1D98-4ECD-B6B7-C0FB8C78DDA1}" type="datetimeFigureOut">
               <a:rPr lang="en-US" smtClean="0"/>
-              <a:t>4/4/2020</a:t>
+              <a:t>4/21/2020</a:t>
             </a:fld>
             <a:endParaRPr lang="en-US"/>
           </a:p>
@@ -432,7 +432,7 @@
           <a:p>
             <a:fld id="{054E8CB3-1D98-4ECD-B6B7-C0FB8C78DDA1}" type="datetimeFigureOut">
               <a:rPr lang="en-US" smtClean="0"/>
-              <a:t>4/4/2020</a:t>
+              <a:t>4/21/2020</a:t>
             </a:fld>
             <a:endParaRPr lang="en-US"/>
           </a:p>
@@ -612,7 +612,7 @@
           <a:p>
             <a:fld id="{054E8CB3-1D98-4ECD-B6B7-C0FB8C78DDA1}" type="datetimeFigureOut">
               <a:rPr lang="en-US" smtClean="0"/>
-              <a:t>4/4/2020</a:t>
+              <a:t>4/21/2020</a:t>
             </a:fld>
             <a:endParaRPr lang="en-US"/>
           </a:p>
@@ -782,7 +782,7 @@
           <a:p>
             <a:fld id="{054E8CB3-1D98-4ECD-B6B7-C0FB8C78DDA1}" type="datetimeFigureOut">
               <a:rPr lang="en-US" smtClean="0"/>
-              <a:t>4/4/2020</a:t>
+              <a:t>4/21/2020</a:t>
             </a:fld>
             <a:endParaRPr lang="en-US"/>
           </a:p>
@@ -1028,7 +1028,7 @@
           <a:p>
             <a:fld id="{054E8CB3-1D98-4ECD-B6B7-C0FB8C78DDA1}" type="datetimeFigureOut">
               <a:rPr lang="en-US" smtClean="0"/>
-              <a:t>4/4/2020</a:t>
+              <a:t>4/21/2020</a:t>
             </a:fld>
             <a:endParaRPr lang="en-US"/>
           </a:p>
@@ -1260,7 +1260,7 @@
           <a:p>
             <a:fld id="{054E8CB3-1D98-4ECD-B6B7-C0FB8C78DDA1}" type="datetimeFigureOut">
               <a:rPr lang="en-US" smtClean="0"/>
-              <a:t>4/4/2020</a:t>
+              <a:t>4/21/2020</a:t>
             </a:fld>
             <a:endParaRPr lang="en-US"/>
           </a:p>
@@ -1627,7 +1627,7 @@
           <a:p>
             <a:fld id="{054E8CB3-1D98-4ECD-B6B7-C0FB8C78DDA1}" type="datetimeFigureOut">
               <a:rPr lang="en-US" smtClean="0"/>
-              <a:t>4/4/2020</a:t>
+              <a:t>4/21/2020</a:t>
             </a:fld>
             <a:endParaRPr lang="en-US"/>
           </a:p>
@@ -1745,7 +1745,7 @@
           <a:p>
             <a:fld id="{054E8CB3-1D98-4ECD-B6B7-C0FB8C78DDA1}" type="datetimeFigureOut">
               <a:rPr lang="en-US" smtClean="0"/>
-              <a:t>4/4/2020</a:t>
+              <a:t>4/21/2020</a:t>
             </a:fld>
             <a:endParaRPr lang="en-US"/>
           </a:p>
@@ -1840,7 +1840,7 @@
           <a:p>
             <a:fld id="{054E8CB3-1D98-4ECD-B6B7-C0FB8C78DDA1}" type="datetimeFigureOut">
               <a:rPr lang="en-US" smtClean="0"/>
-              <a:t>4/4/2020</a:t>
+              <a:t>4/21/2020</a:t>
             </a:fld>
             <a:endParaRPr lang="en-US"/>
           </a:p>
@@ -2117,7 +2117,7 @@
           <a:p>
             <a:fld id="{054E8CB3-1D98-4ECD-B6B7-C0FB8C78DDA1}" type="datetimeFigureOut">
               <a:rPr lang="en-US" smtClean="0"/>
-              <a:t>4/4/2020</a:t>
+              <a:t>4/21/2020</a:t>
             </a:fld>
             <a:endParaRPr lang="en-US"/>
           </a:p>
@@ -2370,7 +2370,7 @@
           <a:p>
             <a:fld id="{054E8CB3-1D98-4ECD-B6B7-C0FB8C78DDA1}" type="datetimeFigureOut">
               <a:rPr lang="en-US" smtClean="0"/>
-              <a:t>4/4/2020</a:t>
+              <a:t>4/21/2020</a:t>
             </a:fld>
             <a:endParaRPr lang="en-US"/>
           </a:p>
@@ -2583,7 +2583,7 @@
           <a:p>
             <a:fld id="{054E8CB3-1D98-4ECD-B6B7-C0FB8C78DDA1}" type="datetimeFigureOut">
               <a:rPr lang="en-US" smtClean="0"/>
-              <a:t>4/4/2020</a:t>
+              <a:t>4/21/2020</a:t>
             </a:fld>
             <a:endParaRPr lang="en-US"/>
           </a:p>
@@ -7429,10 +7429,6 @@
                 </a:rPr>
                 <a:t>Active TSS </a:t>
               </a:r>
-              <a:endParaRPr lang="en-US" sz="1600" dirty="0">
-                <a:latin typeface="Cambria Math" panose="02040503050406030204" pitchFamily="18" charset="0"/>
-                <a:ea typeface="Cambria Math" panose="02040503050406030204" pitchFamily="18" charset="0"/>
-              </a:endParaRPr>
             </a:p>
           </p:txBody>
         </p:sp>
@@ -8373,10 +8369,6 @@
                   </a:rPr>
                   <a:t>Active TSS </a:t>
                 </a:r>
-                <a:endParaRPr lang="en-US" sz="1600" dirty="0">
-                  <a:latin typeface="Cambria Math" panose="02040503050406030204" pitchFamily="18" charset="0"/>
-                  <a:ea typeface="Cambria Math" panose="02040503050406030204" pitchFamily="18" charset="0"/>
-                </a:endParaRPr>
               </a:p>
             </p:txBody>
           </p:sp>
@@ -10824,9 +10816,9 @@
         <p:grpSpPr>
           <a:xfrm>
             <a:off x="-953786" y="334495"/>
-            <a:ext cx="13645489" cy="6118830"/>
+            <a:ext cx="13645489" cy="6115661"/>
             <a:chOff x="-953786" y="334495"/>
-            <a:chExt cx="13645489" cy="6118830"/>
+            <a:chExt cx="13645489" cy="6115661"/>
           </a:xfrm>
         </p:grpSpPr>
         <p:pic>
@@ -10851,7 +10843,7 @@
           </p:blipFill>
           <p:spPr>
             <a:xfrm>
-              <a:off x="75838" y="500581"/>
+              <a:off x="76241" y="497412"/>
               <a:ext cx="11455646" cy="5952744"/>
             </a:xfrm>
             <a:prstGeom prst="rect">
@@ -11910,7 +11902,14 @@
                   <a:latin typeface="Cambria Math" panose="02040503050406030204" pitchFamily="18" charset="0"/>
                   <a:ea typeface="Cambria Math" panose="02040503050406030204" pitchFamily="18" charset="0"/>
                 </a:rPr>
-                <a:t>Umbilical Vein </a:t>
+                <a:t>Umbilical </a:t>
+              </a:r>
+              <a:r>
+                <a:rPr lang="en-US" dirty="0" smtClean="0">
+                  <a:latin typeface="Cambria Math" panose="02040503050406030204" pitchFamily="18" charset="0"/>
+                  <a:ea typeface="Cambria Math" panose="02040503050406030204" pitchFamily="18" charset="0"/>
+                </a:rPr>
+                <a:t>Vein</a:t>
               </a:r>
               <a:endParaRPr lang="en-US" dirty="0" smtClean="0">
                 <a:latin typeface="Cambria Math" panose="02040503050406030204" pitchFamily="18" charset="0"/>
@@ -15132,7 +15131,7 @@
           </p:nvSpPr>
           <p:spPr>
             <a:xfrm>
-              <a:off x="-191278" y="1442054"/>
+              <a:off x="-161173" y="1532571"/>
               <a:ext cx="1603323" cy="369332"/>
             </a:xfrm>
             <a:prstGeom prst="rect">
@@ -15168,7 +15167,7 @@
           </p:nvSpPr>
           <p:spPr>
             <a:xfrm>
-              <a:off x="640489" y="4688616"/>
+              <a:off x="640488" y="4669663"/>
               <a:ext cx="772840" cy="369332"/>
             </a:xfrm>
             <a:prstGeom prst="rect">
@@ -16401,27 +16400,7 @@
                   <a:latin typeface="Cambria Math" panose="02040503050406030204" pitchFamily="18" charset="0"/>
                   <a:ea typeface="Cambria Math" panose="02040503050406030204" pitchFamily="18" charset="0"/>
                 </a:rPr>
-                <a:t>Gastric (</a:t>
-              </a:r>
-              <a:r>
-                <a:rPr lang="en-US" sz="2400" dirty="0">
-                  <a:solidFill>
-                    <a:schemeClr val="tx1"/>
-                  </a:solidFill>
-                  <a:latin typeface="Cambria Math" panose="02040503050406030204" pitchFamily="18" charset="0"/>
-                  <a:ea typeface="Cambria Math" panose="02040503050406030204" pitchFamily="18" charset="0"/>
-                </a:rPr>
-                <a:t>E094</a:t>
-              </a:r>
-              <a:r>
-                <a:rPr lang="en-US" sz="2400" dirty="0">
-                  <a:solidFill>
-                    <a:schemeClr val="tx1"/>
-                  </a:solidFill>
-                  <a:latin typeface="Cambria Math" panose="02040503050406030204" pitchFamily="18" charset="0"/>
-                  <a:ea typeface="Cambria Math" panose="02040503050406030204" pitchFamily="18" charset="0"/>
-                </a:rPr>
-                <a:t>) </a:t>
+                <a:t>Gastric (E094) </a:t>
               </a:r>
               <a:r>
                 <a:rPr lang="en-US" sz="2400" dirty="0" smtClean="0">
@@ -16451,35 +16430,8 @@
                   <a:latin typeface="Cambria Math" panose="02040503050406030204" pitchFamily="18" charset="0"/>
                   <a:ea typeface="Cambria Math" panose="02040503050406030204" pitchFamily="18" charset="0"/>
                 </a:rPr>
-                <a:t> (</a:t>
+                <a:t> (E004)</a:t>
               </a:r>
-              <a:r>
-                <a:rPr lang="en-US" sz="2400" dirty="0">
-                  <a:solidFill>
-                    <a:schemeClr val="tx1"/>
-                  </a:solidFill>
-                  <a:latin typeface="Cambria Math" panose="02040503050406030204" pitchFamily="18" charset="0"/>
-                  <a:ea typeface="Cambria Math" panose="02040503050406030204" pitchFamily="18" charset="0"/>
-                </a:rPr>
-                <a:t>E004</a:t>
-              </a:r>
-              <a:r>
-                <a:rPr lang="en-US" sz="2400" dirty="0">
-                  <a:solidFill>
-                    <a:schemeClr val="tx1"/>
-                  </a:solidFill>
-                  <a:latin typeface="Cambria Math" panose="02040503050406030204" pitchFamily="18" charset="0"/>
-                  <a:ea typeface="Cambria Math" panose="02040503050406030204" pitchFamily="18" charset="0"/>
-                </a:rPr>
-                <a:t>)</a:t>
-              </a:r>
-              <a:endParaRPr lang="en-US" sz="2400" dirty="0">
-                <a:solidFill>
-                  <a:schemeClr val="tx1"/>
-                </a:solidFill>
-                <a:latin typeface="Cambria Math" panose="02040503050406030204" pitchFamily="18" charset="0"/>
-                <a:ea typeface="Cambria Math" panose="02040503050406030204" pitchFamily="18" charset="0"/>
-              </a:endParaRPr>
             </a:p>
           </p:txBody>
         </p:sp>
@@ -17692,8 +17644,8 @@
           </p:nvSpPr>
           <p:spPr>
             <a:xfrm>
-              <a:off x="-191278" y="1442054"/>
-              <a:ext cx="1603323" cy="369332"/>
+              <a:off x="482973" y="1515944"/>
+              <a:ext cx="877163" cy="369332"/>
             </a:xfrm>
             <a:prstGeom prst="rect">
               <a:avLst/>
@@ -17705,13 +17657,12 @@
             </a:bodyPr>
             <a:lstStyle/>
             <a:p>
-              <a:pPr algn="l"/>
               <a:r>
-                <a:rPr lang="en-US" dirty="0" err="1">
+                <a:rPr lang="en-US" dirty="0">
                   <a:latin typeface="Cambria Math" panose="02040503050406030204" pitchFamily="18" charset="0"/>
                   <a:ea typeface="Cambria Math" panose="02040503050406030204" pitchFamily="18" charset="0"/>
                 </a:rPr>
-                <a:t>Mesendoderm</a:t>
+                <a:t>Gastric</a:t>
               </a:r>
               <a:endParaRPr lang="en-US" dirty="0">
                 <a:latin typeface="Cambria Math" panose="02040503050406030204" pitchFamily="18" charset="0"/>
@@ -17728,8 +17679,8 @@
           </p:nvSpPr>
           <p:spPr>
             <a:xfrm>
-              <a:off x="640489" y="4688616"/>
-              <a:ext cx="772840" cy="369332"/>
+              <a:off x="-236964" y="4660908"/>
+              <a:ext cx="1603324" cy="369332"/>
             </a:xfrm>
             <a:prstGeom prst="rect">
               <a:avLst/>
@@ -17741,14 +17692,17 @@
             </a:bodyPr>
             <a:lstStyle/>
             <a:p>
-              <a:pPr algn="l"/>
               <a:r>
-                <a:rPr lang="en-US" dirty="0">
+                <a:rPr lang="en-US" dirty="0" err="1">
                   <a:latin typeface="Cambria Math" panose="02040503050406030204" pitchFamily="18" charset="0"/>
                   <a:ea typeface="Cambria Math" panose="02040503050406030204" pitchFamily="18" charset="0"/>
                 </a:rPr>
-                <a:t>Ovary</a:t>
+                <a:t>Mesendoderm</a:t>
               </a:r>
+              <a:endParaRPr lang="en-US" dirty="0">
+                <a:latin typeface="Cambria Math" panose="02040503050406030204" pitchFamily="18" charset="0"/>
+                <a:ea typeface="Cambria Math" panose="02040503050406030204" pitchFamily="18" charset="0"/>
+              </a:endParaRPr>
             </a:p>
           </p:txBody>
         </p:sp>

</xml_diff>